<commit_message>
Added text to presentation
</commit_message>
<xml_diff>
--- a/Prezentacja.pptx
+++ b/Prezentacja.pptx
@@ -7,20 +7,19 @@
   <p:sldIdLst>
     <p:sldId id="256" r:id="rId2"/>
     <p:sldId id="257" r:id="rId3"/>
-    <p:sldId id="271" r:id="rId4"/>
-    <p:sldId id="258" r:id="rId5"/>
-    <p:sldId id="259" r:id="rId6"/>
-    <p:sldId id="260" r:id="rId7"/>
-    <p:sldId id="261" r:id="rId8"/>
-    <p:sldId id="262" r:id="rId9"/>
-    <p:sldId id="263" r:id="rId10"/>
-    <p:sldId id="264" r:id="rId11"/>
-    <p:sldId id="265" r:id="rId12"/>
-    <p:sldId id="266" r:id="rId13"/>
-    <p:sldId id="267" r:id="rId14"/>
-    <p:sldId id="268" r:id="rId15"/>
-    <p:sldId id="269" r:id="rId16"/>
-    <p:sldId id="270" r:id="rId17"/>
+    <p:sldId id="258" r:id="rId4"/>
+    <p:sldId id="259" r:id="rId5"/>
+    <p:sldId id="260" r:id="rId6"/>
+    <p:sldId id="261" r:id="rId7"/>
+    <p:sldId id="262" r:id="rId8"/>
+    <p:sldId id="263" r:id="rId9"/>
+    <p:sldId id="264" r:id="rId10"/>
+    <p:sldId id="265" r:id="rId11"/>
+    <p:sldId id="266" r:id="rId12"/>
+    <p:sldId id="267" r:id="rId13"/>
+    <p:sldId id="268" r:id="rId14"/>
+    <p:sldId id="269" r:id="rId15"/>
+    <p:sldId id="270" r:id="rId16"/>
   </p:sldIdLst>
   <p:sldSz cx="9144000" cy="5143500" type="screen16x9"/>
   <p:notesSz cx="6858000" cy="9144000"/>
@@ -3213,290 +3212,6 @@
       </p:grpSpPr>
       <p:pic>
         <p:nvPicPr>
-          <p:cNvPr id="4" name="Picture 3"/>
-          <p:cNvPicPr>
-            <a:picLocks noChangeAspect="1" noChangeArrowheads="1"/>
-          </p:cNvPicPr>
-          <p:nvPr/>
-        </p:nvPicPr>
-        <p:blipFill>
-          <a:blip r:embed="rId2">
-            <a:extLst>
-              <a:ext uri="{28A0092B-C50C-407E-A947-70E740481C1C}">
-                <a14:useLocalDpi xmlns:a14="http://schemas.microsoft.com/office/drawing/2010/main" val="0"/>
-              </a:ext>
-            </a:extLst>
-          </a:blip>
-          <a:srcRect/>
-          <a:stretch>
-            <a:fillRect/>
-          </a:stretch>
-        </p:blipFill>
-        <p:spPr bwMode="auto">
-          <a:xfrm>
-            <a:off x="0" y="0"/>
-            <a:ext cx="4896544" cy="3888812"/>
-          </a:xfrm>
-          <a:prstGeom prst="rect">
-            <a:avLst/>
-          </a:prstGeom>
-          <a:noFill/>
-          <a:ln w="9525">
-            <a:solidFill>
-              <a:srgbClr val="C00000"/>
-            </a:solidFill>
-            <a:miter lim="800000"/>
-            <a:headEnd/>
-            <a:tailEnd/>
-          </a:ln>
-          <a:extLst>
-            <a:ext uri="{909E8E84-426E-40DD-AFC4-6F175D3DCCD1}">
-              <a14:hiddenFill xmlns:a14="http://schemas.microsoft.com/office/drawing/2010/main">
-                <a:solidFill>
-                  <a:schemeClr val="accent1"/>
-                </a:solidFill>
-              </a14:hiddenFill>
-            </a:ext>
-          </a:extLst>
-        </p:spPr>
-      </p:pic>
-      <p:pic>
-        <p:nvPicPr>
-          <p:cNvPr id="8195" name="Picture 3"/>
-          <p:cNvPicPr>
-            <a:picLocks noChangeAspect="1" noChangeArrowheads="1"/>
-          </p:cNvPicPr>
-          <p:nvPr/>
-        </p:nvPicPr>
-        <p:blipFill>
-          <a:blip r:embed="rId3">
-            <a:extLst>
-              <a:ext uri="{28A0092B-C50C-407E-A947-70E740481C1C}">
-                <a14:useLocalDpi xmlns:a14="http://schemas.microsoft.com/office/drawing/2010/main" val="0"/>
-              </a:ext>
-            </a:extLst>
-          </a:blip>
-          <a:srcRect/>
-          <a:stretch>
-            <a:fillRect/>
-          </a:stretch>
-        </p:blipFill>
-        <p:spPr bwMode="auto">
-          <a:xfrm>
-            <a:off x="4427984" y="1024674"/>
-            <a:ext cx="4713695" cy="4118826"/>
-          </a:xfrm>
-          <a:prstGeom prst="rect">
-            <a:avLst/>
-          </a:prstGeom>
-          <a:noFill/>
-          <a:ln>
-            <a:noFill/>
-          </a:ln>
-          <a:extLst>
-            <a:ext uri="{909E8E84-426E-40DD-AFC4-6F175D3DCCD1}">
-              <a14:hiddenFill xmlns:a14="http://schemas.microsoft.com/office/drawing/2010/main">
-                <a:solidFill>
-                  <a:schemeClr val="accent1"/>
-                </a:solidFill>
-              </a14:hiddenFill>
-            </a:ext>
-            <a:ext uri="{91240B29-F687-4F45-9708-019B960494DF}">
-              <a14:hiddenLine xmlns:a14="http://schemas.microsoft.com/office/drawing/2010/main" w="9525">
-                <a:solidFill>
-                  <a:schemeClr val="tx1"/>
-                </a:solidFill>
-                <a:miter lim="800000"/>
-                <a:headEnd/>
-                <a:tailEnd/>
-              </a14:hiddenLine>
-            </a:ext>
-          </a:extLst>
-        </p:spPr>
-      </p:pic>
-      <p:cxnSp>
-        <p:nvCxnSpPr>
-          <p:cNvPr id="7" name="Łącznik prosty ze strzałką 6"/>
-          <p:cNvCxnSpPr/>
-          <p:nvPr/>
-        </p:nvCxnSpPr>
-        <p:spPr>
-          <a:xfrm flipV="1">
-            <a:off x="7164288" y="3773098"/>
-            <a:ext cx="360000" cy="360040"/>
-          </a:xfrm>
-          <a:prstGeom prst="straightConnector1">
-            <a:avLst/>
-          </a:prstGeom>
-          <a:ln w="38100">
-            <a:solidFill>
-              <a:srgbClr val="C00000"/>
-            </a:solidFill>
-            <a:tailEnd type="arrow"/>
-          </a:ln>
-        </p:spPr>
-        <p:style>
-          <a:lnRef idx="1">
-            <a:schemeClr val="accent1"/>
-          </a:lnRef>
-          <a:fillRef idx="0">
-            <a:schemeClr val="accent1"/>
-          </a:fillRef>
-          <a:effectRef idx="0">
-            <a:schemeClr val="accent1"/>
-          </a:effectRef>
-          <a:fontRef idx="minor">
-            <a:schemeClr val="tx1"/>
-          </a:fontRef>
-        </p:style>
-      </p:cxnSp>
-      <p:cxnSp>
-        <p:nvCxnSpPr>
-          <p:cNvPr id="10" name="Łącznik prosty ze strzałką 9"/>
-          <p:cNvCxnSpPr/>
-          <p:nvPr/>
-        </p:nvCxnSpPr>
-        <p:spPr>
-          <a:xfrm flipV="1">
-            <a:off x="6086247" y="4703013"/>
-            <a:ext cx="360000" cy="360040"/>
-          </a:xfrm>
-          <a:prstGeom prst="straightConnector1">
-            <a:avLst/>
-          </a:prstGeom>
-          <a:ln w="38100">
-            <a:solidFill>
-              <a:srgbClr val="C00000"/>
-            </a:solidFill>
-            <a:tailEnd type="arrow"/>
-          </a:ln>
-        </p:spPr>
-        <p:style>
-          <a:lnRef idx="1">
-            <a:schemeClr val="accent1"/>
-          </a:lnRef>
-          <a:fillRef idx="0">
-            <a:schemeClr val="accent1"/>
-          </a:fillRef>
-          <a:effectRef idx="0">
-            <a:schemeClr val="accent1"/>
-          </a:effectRef>
-          <a:fontRef idx="minor">
-            <a:schemeClr val="tx1"/>
-          </a:fontRef>
-        </p:style>
-      </p:cxnSp>
-      <p:cxnSp>
-        <p:nvCxnSpPr>
-          <p:cNvPr id="11" name="Łącznik prosty ze strzałką 10"/>
-          <p:cNvCxnSpPr/>
-          <p:nvPr/>
-        </p:nvCxnSpPr>
-        <p:spPr>
-          <a:xfrm flipV="1">
-            <a:off x="5428731" y="3773098"/>
-            <a:ext cx="360000" cy="360040"/>
-          </a:xfrm>
-          <a:prstGeom prst="straightConnector1">
-            <a:avLst/>
-          </a:prstGeom>
-          <a:ln w="38100">
-            <a:solidFill>
-              <a:srgbClr val="C00000"/>
-            </a:solidFill>
-            <a:tailEnd type="arrow"/>
-          </a:ln>
-        </p:spPr>
-        <p:style>
-          <a:lnRef idx="1">
-            <a:schemeClr val="accent1"/>
-          </a:lnRef>
-          <a:fillRef idx="0">
-            <a:schemeClr val="accent1"/>
-          </a:fillRef>
-          <a:effectRef idx="0">
-            <a:schemeClr val="accent1"/>
-          </a:effectRef>
-          <a:fontRef idx="minor">
-            <a:schemeClr val="tx1"/>
-          </a:fontRef>
-        </p:style>
-      </p:cxnSp>
-      <p:cxnSp>
-        <p:nvCxnSpPr>
-          <p:cNvPr id="12" name="Łącznik prosty ze strzałką 11"/>
-          <p:cNvCxnSpPr/>
-          <p:nvPr/>
-        </p:nvCxnSpPr>
-        <p:spPr>
-          <a:xfrm flipV="1">
-            <a:off x="8532440" y="2067694"/>
-            <a:ext cx="360000" cy="360040"/>
-          </a:xfrm>
-          <a:prstGeom prst="straightConnector1">
-            <a:avLst/>
-          </a:prstGeom>
-          <a:ln w="38100">
-            <a:solidFill>
-              <a:srgbClr val="C00000"/>
-            </a:solidFill>
-            <a:tailEnd type="arrow"/>
-          </a:ln>
-        </p:spPr>
-        <p:style>
-          <a:lnRef idx="1">
-            <a:schemeClr val="accent1"/>
-          </a:lnRef>
-          <a:fillRef idx="0">
-            <a:schemeClr val="accent1"/>
-          </a:fillRef>
-          <a:effectRef idx="0">
-            <a:schemeClr val="accent1"/>
-          </a:effectRef>
-          <a:fontRef idx="minor">
-            <a:schemeClr val="tx1"/>
-          </a:fontRef>
-        </p:style>
-      </p:cxnSp>
-    </p:spTree>
-    <p:extLst>
-      <p:ext uri="{BB962C8B-B14F-4D97-AF65-F5344CB8AC3E}">
-        <p14:creationId xmlns:p14="http://schemas.microsoft.com/office/powerpoint/2010/main" val="1966361253"/>
-      </p:ext>
-    </p:extLst>
-  </p:cSld>
-  <p:clrMapOvr>
-    <a:masterClrMapping/>
-  </p:clrMapOvr>
-  <p:timing>
-    <p:tnLst>
-      <p:par>
-        <p:cTn id="1" dur="indefinite" restart="never" nodeType="tmRoot"/>
-      </p:par>
-    </p:tnLst>
-  </p:timing>
-</p:sld>
-</file>
-
-<file path=ppt/slides/slide11.xml><?xml version="1.0" encoding="utf-8"?>
-<p:sld xmlns:a="http://schemas.openxmlformats.org/drawingml/2006/main" xmlns:r="http://schemas.openxmlformats.org/officeDocument/2006/relationships" xmlns:p="http://schemas.openxmlformats.org/presentationml/2006/main">
-  <p:cSld>
-    <p:spTree>
-      <p:nvGrpSpPr>
-        <p:cNvPr id="1" name=""/>
-        <p:cNvGrpSpPr/>
-        <p:nvPr/>
-      </p:nvGrpSpPr>
-      <p:grpSpPr>
-        <a:xfrm>
-          <a:off x="0" y="0"/>
-          <a:ext cx="0" cy="0"/>
-          <a:chOff x="0" y="0"/>
-          <a:chExt cx="0" cy="0"/>
-        </a:xfrm>
-      </p:grpSpPr>
-      <p:pic>
-        <p:nvPicPr>
           <p:cNvPr id="9218" name="Picture 2"/>
           <p:cNvPicPr>
             <a:picLocks noChangeAspect="1" noChangeArrowheads="1"/>
@@ -3567,7 +3282,7 @@
         </p:blipFill>
         <p:spPr bwMode="auto">
           <a:xfrm>
-            <a:off x="4578396" y="1270006"/>
+            <a:off x="4499992" y="771550"/>
             <a:ext cx="4565604" cy="3860011"/>
           </a:xfrm>
           <a:prstGeom prst="rect">
@@ -3601,7 +3316,7 @@
         </p:nvCxnSpPr>
         <p:spPr>
           <a:xfrm flipV="1">
-            <a:off x="4644008" y="3634596"/>
+            <a:off x="4565604" y="3136140"/>
             <a:ext cx="360000" cy="360040"/>
           </a:xfrm>
           <a:prstGeom prst="straightConnector1">
@@ -3637,7 +3352,7 @@
         </p:nvCxnSpPr>
         <p:spPr>
           <a:xfrm flipV="1">
-            <a:off x="5724128" y="4371950"/>
+            <a:off x="5645724" y="3873494"/>
             <a:ext cx="360000" cy="360040"/>
           </a:xfrm>
           <a:prstGeom prst="straightConnector1">
@@ -3673,7 +3388,7 @@
         </p:nvCxnSpPr>
         <p:spPr>
           <a:xfrm flipV="1">
-            <a:off x="7135057" y="4191930"/>
+            <a:off x="7056653" y="3693474"/>
             <a:ext cx="360000" cy="360040"/>
           </a:xfrm>
           <a:prstGeom prst="straightConnector1">
@@ -3701,6 +3416,36 @@
           </a:fontRef>
         </p:style>
       </p:cxnSp>
+      <p:sp>
+        <p:nvSpPr>
+          <p:cNvPr id="9" name="Symbol zastępczy zawartości 2"/>
+          <p:cNvSpPr>
+            <a:spLocks noGrp="1"/>
+          </p:cNvSpPr>
+          <p:nvPr>
+            <p:ph idx="1"/>
+          </p:nvPr>
+        </p:nvSpPr>
+        <p:spPr>
+          <a:xfrm>
+            <a:off x="395536" y="4631561"/>
+            <a:ext cx="8280920" cy="511939"/>
+          </a:xfrm>
+        </p:spPr>
+        <p:txBody>
+          <a:bodyPr>
+            <a:normAutofit/>
+          </a:bodyPr>
+          <a:lstStyle/>
+          <a:p>
+            <a:r>
+              <a:rPr lang="pl-PL" sz="1800" dirty="0" smtClean="0"/>
+              <a:t>Zlikwidowanie fragmentów autostrady zwiększył ruch przez miasto</a:t>
+            </a:r>
+            <a:endParaRPr lang="pl-PL" sz="1800" dirty="0"/>
+          </a:p>
+        </p:txBody>
+      </p:sp>
     </p:spTree>
     <p:extLst>
       <p:ext uri="{BB962C8B-B14F-4D97-AF65-F5344CB8AC3E}">
@@ -3721,7 +3466,7 @@
 </p:sld>
 </file>
 
-<file path=ppt/slides/slide12.xml><?xml version="1.0" encoding="utf-8"?>
+<file path=ppt/slides/slide11.xml><?xml version="1.0" encoding="utf-8"?>
 <p:sld xmlns:a="http://schemas.openxmlformats.org/drawingml/2006/main" xmlns:r="http://schemas.openxmlformats.org/officeDocument/2006/relationships" xmlns:p="http://schemas.openxmlformats.org/presentationml/2006/main">
   <p:cSld>
     <p:spTree>
@@ -3792,6 +3537,34 @@
           </a:extLst>
         </p:spPr>
       </p:pic>
+      <p:sp>
+        <p:nvSpPr>
+          <p:cNvPr id="3" name="Tytuł 1"/>
+          <p:cNvSpPr>
+            <a:spLocks noGrp="1"/>
+          </p:cNvSpPr>
+          <p:nvPr>
+            <p:ph type="title"/>
+          </p:nvPr>
+        </p:nvSpPr>
+        <p:spPr>
+          <a:xfrm>
+            <a:off x="395536" y="0"/>
+            <a:ext cx="8229600" cy="857250"/>
+          </a:xfrm>
+        </p:spPr>
+        <p:txBody>
+          <a:bodyPr/>
+          <a:lstStyle/>
+          <a:p>
+            <a:r>
+              <a:rPr lang="pl-PL" dirty="0" smtClean="0"/>
+              <a:t>Rzeszów</a:t>
+            </a:r>
+            <a:endParaRPr lang="pl-PL" dirty="0"/>
+          </a:p>
+        </p:txBody>
+      </p:sp>
     </p:spTree>
     <p:extLst>
       <p:ext uri="{BB962C8B-B14F-4D97-AF65-F5344CB8AC3E}">
@@ -3812,7 +3585,7 @@
 </p:sld>
 </file>
 
-<file path=ppt/slides/slide13.xml><?xml version="1.0" encoding="utf-8"?>
+<file path=ppt/slides/slide12.xml><?xml version="1.0" encoding="utf-8"?>
 <p:sld xmlns:a="http://schemas.openxmlformats.org/drawingml/2006/main" xmlns:r="http://schemas.openxmlformats.org/officeDocument/2006/relationships" xmlns:p="http://schemas.openxmlformats.org/presentationml/2006/main">
   <p:cSld>
     <p:spTree>
@@ -3883,6 +3656,36 @@
           </a:extLst>
         </p:spPr>
       </p:pic>
+      <p:sp>
+        <p:nvSpPr>
+          <p:cNvPr id="3" name="Tytuł 1"/>
+          <p:cNvSpPr>
+            <a:spLocks noGrp="1"/>
+          </p:cNvSpPr>
+          <p:nvPr>
+            <p:ph type="title"/>
+          </p:nvPr>
+        </p:nvSpPr>
+        <p:spPr>
+          <a:xfrm>
+            <a:off x="395536" y="0"/>
+            <a:ext cx="8229600" cy="857250"/>
+          </a:xfrm>
+        </p:spPr>
+        <p:txBody>
+          <a:bodyPr>
+            <a:normAutofit/>
+          </a:bodyPr>
+          <a:lstStyle/>
+          <a:p>
+            <a:r>
+              <a:rPr lang="pl-PL" dirty="0" smtClean="0"/>
+              <a:t>Warszawa</a:t>
+            </a:r>
+            <a:endParaRPr lang="pl-PL" dirty="0"/>
+          </a:p>
+        </p:txBody>
+      </p:sp>
     </p:spTree>
     <p:extLst>
       <p:ext uri="{BB962C8B-B14F-4D97-AF65-F5344CB8AC3E}">
@@ -3903,7 +3706,7 @@
 </p:sld>
 </file>
 
-<file path=ppt/slides/slide14.xml><?xml version="1.0" encoding="utf-8"?>
+<file path=ppt/slides/slide13.xml><?xml version="1.0" encoding="utf-8"?>
 <p:sld xmlns:a="http://schemas.openxmlformats.org/drawingml/2006/main" xmlns:r="http://schemas.openxmlformats.org/officeDocument/2006/relationships" xmlns:p="http://schemas.openxmlformats.org/presentationml/2006/main">
   <p:cSld>
     <p:spTree>
@@ -3974,6 +3777,34 @@
           </a:extLst>
         </p:spPr>
       </p:pic>
+      <p:sp>
+        <p:nvSpPr>
+          <p:cNvPr id="3" name="Tytuł 1"/>
+          <p:cNvSpPr>
+            <a:spLocks noGrp="1"/>
+          </p:cNvSpPr>
+          <p:nvPr>
+            <p:ph type="title"/>
+          </p:nvPr>
+        </p:nvSpPr>
+        <p:spPr>
+          <a:xfrm>
+            <a:off x="395536" y="0"/>
+            <a:ext cx="8229600" cy="857250"/>
+          </a:xfrm>
+        </p:spPr>
+        <p:txBody>
+          <a:bodyPr/>
+          <a:lstStyle/>
+          <a:p>
+            <a:r>
+              <a:rPr lang="pl-PL" dirty="0" smtClean="0"/>
+              <a:t>Wrocław</a:t>
+            </a:r>
+            <a:endParaRPr lang="pl-PL" dirty="0"/>
+          </a:p>
+        </p:txBody>
+      </p:sp>
     </p:spTree>
     <p:extLst>
       <p:ext uri="{BB962C8B-B14F-4D97-AF65-F5344CB8AC3E}">
@@ -3994,7 +3825,7 @@
 </p:sld>
 </file>
 
-<file path=ppt/slides/slide15.xml><?xml version="1.0" encoding="utf-8"?>
+<file path=ppt/slides/slide14.xml><?xml version="1.0" encoding="utf-8"?>
 <p:sld xmlns:a="http://schemas.openxmlformats.org/drawingml/2006/main" xmlns:r="http://schemas.openxmlformats.org/officeDocument/2006/relationships" xmlns:p="http://schemas.openxmlformats.org/presentationml/2006/main">
   <p:cSld>
     <p:spTree>
@@ -4065,6 +3896,34 @@
           </a:extLst>
         </p:spPr>
       </p:pic>
+      <p:sp>
+        <p:nvSpPr>
+          <p:cNvPr id="3" name="Tytuł 1"/>
+          <p:cNvSpPr>
+            <a:spLocks noGrp="1"/>
+          </p:cNvSpPr>
+          <p:nvPr>
+            <p:ph type="title"/>
+          </p:nvPr>
+        </p:nvSpPr>
+        <p:spPr>
+          <a:xfrm>
+            <a:off x="395536" y="0"/>
+            <a:ext cx="8229600" cy="857250"/>
+          </a:xfrm>
+        </p:spPr>
+        <p:txBody>
+          <a:bodyPr/>
+          <a:lstStyle/>
+          <a:p>
+            <a:r>
+              <a:rPr lang="pl-PL" dirty="0" smtClean="0"/>
+              <a:t>Katowice</a:t>
+            </a:r>
+            <a:endParaRPr lang="pl-PL" dirty="0"/>
+          </a:p>
+        </p:txBody>
+      </p:sp>
     </p:spTree>
     <p:extLst>
       <p:ext uri="{BB962C8B-B14F-4D97-AF65-F5344CB8AC3E}">
@@ -4085,7 +3944,7 @@
 </p:sld>
 </file>
 
-<file path=ppt/slides/slide16.xml><?xml version="1.0" encoding="utf-8"?>
+<file path=ppt/slides/slide15.xml><?xml version="1.0" encoding="utf-8"?>
 <p:sld xmlns:a="http://schemas.openxmlformats.org/drawingml/2006/main" xmlns:r="http://schemas.openxmlformats.org/officeDocument/2006/relationships" xmlns:p="http://schemas.openxmlformats.org/presentationml/2006/main">
   <p:cSld>
     <p:spTree>
@@ -4156,6 +4015,34 @@
           </a:extLst>
         </p:spPr>
       </p:pic>
+      <p:sp>
+        <p:nvSpPr>
+          <p:cNvPr id="3" name="Tytuł 1"/>
+          <p:cNvSpPr>
+            <a:spLocks noGrp="1"/>
+          </p:cNvSpPr>
+          <p:nvPr>
+            <p:ph type="title"/>
+          </p:nvPr>
+        </p:nvSpPr>
+        <p:spPr>
+          <a:xfrm>
+            <a:off x="395536" y="0"/>
+            <a:ext cx="8229600" cy="857250"/>
+          </a:xfrm>
+        </p:spPr>
+        <p:txBody>
+          <a:bodyPr/>
+          <a:lstStyle/>
+          <a:p>
+            <a:r>
+              <a:rPr lang="pl-PL" dirty="0" smtClean="0"/>
+              <a:t>Trójmiasto</a:t>
+            </a:r>
+            <a:endParaRPr lang="pl-PL" dirty="0"/>
+          </a:p>
+        </p:txBody>
+      </p:sp>
     </p:spTree>
     <p:extLst>
       <p:ext uri="{BB962C8B-B14F-4D97-AF65-F5344CB8AC3E}">
@@ -4216,8 +4103,8 @@
         </p:blipFill>
         <p:spPr bwMode="auto">
           <a:xfrm>
-            <a:off x="1941467" y="1763964"/>
-            <a:ext cx="7174631" cy="3403465"/>
+            <a:off x="675788" y="1419622"/>
+            <a:ext cx="7698278" cy="3651870"/>
           </a:xfrm>
           <a:prstGeom prst="rect">
             <a:avLst/>
@@ -4287,23 +4174,29 @@
         </p:nvSpPr>
         <p:spPr>
           <a:xfrm>
-            <a:off x="323528" y="915566"/>
-            <a:ext cx="8229600" cy="3394472"/>
-          </a:xfrm>
-        </p:spPr>
-        <p:txBody>
-          <a:bodyPr/>
-          <a:lstStyle/>
-          <a:p>
-            <a:r>
-              <a:rPr lang="pl-PL" dirty="0" smtClean="0"/>
-              <a:t>Dane źródłowe </a:t>
-            </a:r>
-            <a:r>
-              <a:rPr lang="pl-PL" smtClean="0"/>
-              <a:t>można pobrać [TODO]</a:t>
-            </a:r>
-            <a:endParaRPr lang="pl-PL" dirty="0"/>
+            <a:off x="0" y="771550"/>
+            <a:ext cx="8967237" cy="3394472"/>
+          </a:xfrm>
+        </p:spPr>
+        <p:txBody>
+          <a:bodyPr>
+            <a:normAutofit/>
+          </a:bodyPr>
+          <a:lstStyle/>
+          <a:p>
+            <a:r>
+              <a:rPr lang="pl-PL" sz="1800" dirty="0" smtClean="0"/>
+              <a:t>Dane źródłowe map do działania programu są dostępne są do pobrania na stronie </a:t>
+            </a:r>
+            <a:r>
+              <a:rPr lang="pl-PL" sz="1800" dirty="0" err="1" smtClean="0"/>
+              <a:t>overpass</a:t>
+            </a:r>
+            <a:r>
+              <a:rPr lang="pl-PL" sz="1800" dirty="0" smtClean="0"/>
+              <a:t> turbo po uprzednim wskazaniu obszaru</a:t>
+            </a:r>
+            <a:endParaRPr lang="pl-PL" sz="1800" dirty="0"/>
           </a:p>
         </p:txBody>
       </p:sp>
@@ -4328,81 +4221,6 @@
 </file>
 
 <file path=ppt/slides/slide3.xml><?xml version="1.0" encoding="utf-8"?>
-<p:sld xmlns:a="http://schemas.openxmlformats.org/drawingml/2006/main" xmlns:r="http://schemas.openxmlformats.org/officeDocument/2006/relationships" xmlns:p="http://schemas.openxmlformats.org/presentationml/2006/main">
-  <p:cSld>
-    <p:spTree>
-      <p:nvGrpSpPr>
-        <p:cNvPr id="1" name=""/>
-        <p:cNvGrpSpPr/>
-        <p:nvPr/>
-      </p:nvGrpSpPr>
-      <p:grpSpPr>
-        <a:xfrm>
-          <a:off x="0" y="0"/>
-          <a:ext cx="0" cy="0"/>
-          <a:chOff x="0" y="0"/>
-          <a:chExt cx="0" cy="0"/>
-        </a:xfrm>
-      </p:grpSpPr>
-      <p:sp>
-        <p:nvSpPr>
-          <p:cNvPr id="2" name="Tytuł 1"/>
-          <p:cNvSpPr>
-            <a:spLocks noGrp="1"/>
-          </p:cNvSpPr>
-          <p:nvPr>
-            <p:ph type="title"/>
-          </p:nvPr>
-        </p:nvSpPr>
-        <p:spPr/>
-        <p:txBody>
-          <a:bodyPr/>
-          <a:lstStyle/>
-          <a:p>
-            <a:endParaRPr lang="pl-PL" dirty="0"/>
-          </a:p>
-        </p:txBody>
-      </p:sp>
-      <p:sp>
-        <p:nvSpPr>
-          <p:cNvPr id="3" name="Symbol zastępczy zawartości 2"/>
-          <p:cNvSpPr>
-            <a:spLocks noGrp="1"/>
-          </p:cNvSpPr>
-          <p:nvPr>
-            <p:ph idx="1"/>
-          </p:nvPr>
-        </p:nvSpPr>
-        <p:spPr/>
-        <p:txBody>
-          <a:bodyPr/>
-          <a:lstStyle/>
-          <a:p>
-            <a:endParaRPr lang="pl-PL"/>
-          </a:p>
-        </p:txBody>
-      </p:sp>
-    </p:spTree>
-    <p:extLst>
-      <p:ext uri="{BB962C8B-B14F-4D97-AF65-F5344CB8AC3E}">
-        <p14:creationId xmlns:p14="http://schemas.microsoft.com/office/powerpoint/2010/main" val="3216369713"/>
-      </p:ext>
-    </p:extLst>
-  </p:cSld>
-  <p:clrMapOvr>
-    <a:masterClrMapping/>
-  </p:clrMapOvr>
-  <p:timing>
-    <p:tnLst>
-      <p:par>
-        <p:cTn id="1" dur="indefinite" restart="never" nodeType="tmRoot"/>
-      </p:par>
-    </p:tnLst>
-  </p:timing>
-</p:sld>
-</file>
-
-<file path=ppt/slides/slide4.xml><?xml version="1.0" encoding="utf-8"?>
 <p:sld xmlns:a="http://schemas.openxmlformats.org/drawingml/2006/main" xmlns:r="http://schemas.openxmlformats.org/officeDocument/2006/relationships" xmlns:p="http://schemas.openxmlformats.org/presentationml/2006/main">
   <p:cSld>
     <p:spTree>
@@ -4442,8 +4260,8 @@
         </p:blipFill>
         <p:spPr bwMode="auto">
           <a:xfrm>
-            <a:off x="11807" y="123478"/>
-            <a:ext cx="9144000" cy="4914900"/>
+            <a:off x="251520" y="550967"/>
+            <a:ext cx="8544247" cy="4592533"/>
           </a:xfrm>
           <a:prstGeom prst="rect">
             <a:avLst/>
@@ -4473,10 +4291,357 @@
           </a:extLst>
         </p:spPr>
       </p:pic>
+      <p:sp>
+        <p:nvSpPr>
+          <p:cNvPr id="3" name="Tytuł 1"/>
+          <p:cNvSpPr>
+            <a:spLocks noGrp="1"/>
+          </p:cNvSpPr>
+          <p:nvPr>
+            <p:ph type="title"/>
+          </p:nvPr>
+        </p:nvSpPr>
+        <p:spPr>
+          <a:xfrm>
+            <a:off x="408843" y="-92546"/>
+            <a:ext cx="8229600" cy="857250"/>
+          </a:xfrm>
+        </p:spPr>
+        <p:txBody>
+          <a:bodyPr/>
+          <a:lstStyle/>
+          <a:p>
+            <a:r>
+              <a:rPr lang="pl-PL" dirty="0" smtClean="0"/>
+              <a:t>Prezentacja mapy w programie</a:t>
+            </a:r>
+            <a:endParaRPr lang="pl-PL" dirty="0"/>
+          </a:p>
+        </p:txBody>
+      </p:sp>
     </p:spTree>
     <p:extLst>
       <p:ext uri="{BB962C8B-B14F-4D97-AF65-F5344CB8AC3E}">
         <p14:creationId xmlns:p14="http://schemas.microsoft.com/office/powerpoint/2010/main" val="492514539"/>
+      </p:ext>
+    </p:extLst>
+  </p:cSld>
+  <p:clrMapOvr>
+    <a:masterClrMapping/>
+  </p:clrMapOvr>
+  <p:timing>
+    <p:tnLst>
+      <p:par>
+        <p:cTn id="1" dur="indefinite" restart="never" nodeType="tmRoot"/>
+      </p:par>
+    </p:tnLst>
+  </p:timing>
+</p:sld>
+</file>
+
+<file path=ppt/slides/slide4.xml><?xml version="1.0" encoding="utf-8"?>
+<p:sld xmlns:a="http://schemas.openxmlformats.org/drawingml/2006/main" xmlns:r="http://schemas.openxmlformats.org/officeDocument/2006/relationships" xmlns:p="http://schemas.openxmlformats.org/presentationml/2006/main">
+  <p:cSld>
+    <p:spTree>
+      <p:nvGrpSpPr>
+        <p:cNvPr id="1" name=""/>
+        <p:cNvGrpSpPr/>
+        <p:nvPr/>
+      </p:nvGrpSpPr>
+      <p:grpSpPr>
+        <a:xfrm>
+          <a:off x="0" y="0"/>
+          <a:ext cx="0" cy="0"/>
+          <a:chOff x="0" y="0"/>
+          <a:chExt cx="0" cy="0"/>
+        </a:xfrm>
+      </p:grpSpPr>
+      <p:sp>
+        <p:nvSpPr>
+          <p:cNvPr id="2" name="Tytuł 1"/>
+          <p:cNvSpPr>
+            <a:spLocks noGrp="1"/>
+          </p:cNvSpPr>
+          <p:nvPr>
+            <p:ph type="title"/>
+          </p:nvPr>
+        </p:nvSpPr>
+        <p:spPr>
+          <a:xfrm>
+            <a:off x="395536" y="51470"/>
+            <a:ext cx="8229600" cy="805780"/>
+          </a:xfrm>
+        </p:spPr>
+        <p:txBody>
+          <a:bodyPr/>
+          <a:lstStyle/>
+          <a:p>
+            <a:r>
+              <a:rPr lang="pl-PL" dirty="0" err="1" smtClean="0"/>
+              <a:t>Local</a:t>
+            </a:r>
+            <a:r>
+              <a:rPr lang="pl-PL" dirty="0" smtClean="0"/>
+              <a:t> Clustering </a:t>
+            </a:r>
+            <a:r>
+              <a:rPr lang="pl-PL" dirty="0" err="1" smtClean="0"/>
+              <a:t>Coefficient</a:t>
+            </a:r>
+            <a:endParaRPr lang="pl-PL" dirty="0"/>
+          </a:p>
+        </p:txBody>
+      </p:sp>
+      <p:pic>
+        <p:nvPicPr>
+          <p:cNvPr id="3074" name="Picture 2"/>
+          <p:cNvPicPr>
+            <a:picLocks noChangeAspect="1" noChangeArrowheads="1"/>
+          </p:cNvPicPr>
+          <p:nvPr/>
+        </p:nvPicPr>
+        <p:blipFill>
+          <a:blip r:embed="rId2">
+            <a:extLst>
+              <a:ext uri="{28A0092B-C50C-407E-A947-70E740481C1C}">
+                <a14:useLocalDpi xmlns:a14="http://schemas.microsoft.com/office/drawing/2010/main" val="0"/>
+              </a:ext>
+            </a:extLst>
+          </a:blip>
+          <a:srcRect/>
+          <a:stretch>
+            <a:fillRect/>
+          </a:stretch>
+        </p:blipFill>
+        <p:spPr bwMode="auto">
+          <a:xfrm>
+            <a:off x="528285" y="1119733"/>
+            <a:ext cx="2952328" cy="349827"/>
+          </a:xfrm>
+          <a:prstGeom prst="rect">
+            <a:avLst/>
+          </a:prstGeom>
+          <a:noFill/>
+          <a:ln>
+            <a:noFill/>
+          </a:ln>
+          <a:extLst>
+            <a:ext uri="{909E8E84-426E-40DD-AFC4-6F175D3DCCD1}">
+              <a14:hiddenFill xmlns:a14="http://schemas.microsoft.com/office/drawing/2010/main">
+                <a:solidFill>
+                  <a:schemeClr val="accent1"/>
+                </a:solidFill>
+              </a14:hiddenFill>
+            </a:ext>
+            <a:ext uri="{91240B29-F687-4F45-9708-019B960494DF}">
+              <a14:hiddenLine xmlns:a14="http://schemas.microsoft.com/office/drawing/2010/main" w="9525">
+                <a:solidFill>
+                  <a:schemeClr val="tx1"/>
+                </a:solidFill>
+                <a:miter lim="800000"/>
+                <a:headEnd/>
+                <a:tailEnd/>
+              </a14:hiddenLine>
+            </a:ext>
+          </a:extLst>
+        </p:spPr>
+      </p:pic>
+      <p:pic>
+        <p:nvPicPr>
+          <p:cNvPr id="3075" name="Picture 3"/>
+          <p:cNvPicPr>
+            <a:picLocks noChangeAspect="1" noChangeArrowheads="1"/>
+          </p:cNvPicPr>
+          <p:nvPr/>
+        </p:nvPicPr>
+        <p:blipFill>
+          <a:blip r:embed="rId3">
+            <a:extLst>
+              <a:ext uri="{28A0092B-C50C-407E-A947-70E740481C1C}">
+                <a14:useLocalDpi xmlns:a14="http://schemas.microsoft.com/office/drawing/2010/main" val="0"/>
+              </a:ext>
+            </a:extLst>
+          </a:blip>
+          <a:srcRect/>
+          <a:stretch>
+            <a:fillRect/>
+          </a:stretch>
+        </p:blipFill>
+        <p:spPr bwMode="auto">
+          <a:xfrm>
+            <a:off x="475686" y="1707654"/>
+            <a:ext cx="3057525" cy="619125"/>
+          </a:xfrm>
+          <a:prstGeom prst="rect">
+            <a:avLst/>
+          </a:prstGeom>
+          <a:noFill/>
+          <a:ln>
+            <a:noFill/>
+          </a:ln>
+          <a:extLst>
+            <a:ext uri="{909E8E84-426E-40DD-AFC4-6F175D3DCCD1}">
+              <a14:hiddenFill xmlns:a14="http://schemas.microsoft.com/office/drawing/2010/main">
+                <a:solidFill>
+                  <a:schemeClr val="accent1"/>
+                </a:solidFill>
+              </a14:hiddenFill>
+            </a:ext>
+            <a:ext uri="{91240B29-F687-4F45-9708-019B960494DF}">
+              <a14:hiddenLine xmlns:a14="http://schemas.microsoft.com/office/drawing/2010/main" w="9525">
+                <a:solidFill>
+                  <a:schemeClr val="tx1"/>
+                </a:solidFill>
+                <a:miter lim="800000"/>
+                <a:headEnd/>
+                <a:tailEnd/>
+              </a14:hiddenLine>
+            </a:ext>
+          </a:extLst>
+        </p:spPr>
+      </p:pic>
+      <p:pic>
+        <p:nvPicPr>
+          <p:cNvPr id="3076" name="Picture 4"/>
+          <p:cNvPicPr>
+            <a:picLocks noChangeAspect="1" noChangeArrowheads="1"/>
+          </p:cNvPicPr>
+          <p:nvPr/>
+        </p:nvPicPr>
+        <p:blipFill>
+          <a:blip r:embed="rId4">
+            <a:extLst>
+              <a:ext uri="{28A0092B-C50C-407E-A947-70E740481C1C}">
+                <a14:useLocalDpi xmlns:a14="http://schemas.microsoft.com/office/drawing/2010/main" val="0"/>
+              </a:ext>
+            </a:extLst>
+          </a:blip>
+          <a:srcRect/>
+          <a:stretch>
+            <a:fillRect/>
+          </a:stretch>
+        </p:blipFill>
+        <p:spPr bwMode="auto">
+          <a:xfrm>
+            <a:off x="575611" y="2499742"/>
+            <a:ext cx="2857676" cy="1843899"/>
+          </a:xfrm>
+          <a:prstGeom prst="rect">
+            <a:avLst/>
+          </a:prstGeom>
+          <a:noFill/>
+          <a:ln>
+            <a:noFill/>
+          </a:ln>
+          <a:extLst>
+            <a:ext uri="{909E8E84-426E-40DD-AFC4-6F175D3DCCD1}">
+              <a14:hiddenFill xmlns:a14="http://schemas.microsoft.com/office/drawing/2010/main">
+                <a:solidFill>
+                  <a:schemeClr val="accent1"/>
+                </a:solidFill>
+              </a14:hiddenFill>
+            </a:ext>
+            <a:ext uri="{91240B29-F687-4F45-9708-019B960494DF}">
+              <a14:hiddenLine xmlns:a14="http://schemas.microsoft.com/office/drawing/2010/main" w="9525">
+                <a:solidFill>
+                  <a:schemeClr val="tx1"/>
+                </a:solidFill>
+                <a:miter lim="800000"/>
+                <a:headEnd/>
+                <a:tailEnd/>
+              </a14:hiddenLine>
+            </a:ext>
+          </a:extLst>
+        </p:spPr>
+      </p:pic>
+      <p:pic>
+        <p:nvPicPr>
+          <p:cNvPr id="3077" name="Picture 5"/>
+          <p:cNvPicPr>
+            <a:picLocks noChangeAspect="1" noChangeArrowheads="1"/>
+          </p:cNvPicPr>
+          <p:nvPr/>
+        </p:nvPicPr>
+        <p:blipFill>
+          <a:blip r:embed="rId5">
+            <a:extLst>
+              <a:ext uri="{28A0092B-C50C-407E-A947-70E740481C1C}">
+                <a14:useLocalDpi xmlns:a14="http://schemas.microsoft.com/office/drawing/2010/main" val="0"/>
+              </a:ext>
+            </a:extLst>
+          </a:blip>
+          <a:srcRect/>
+          <a:stretch>
+            <a:fillRect/>
+          </a:stretch>
+        </p:blipFill>
+        <p:spPr bwMode="auto">
+          <a:xfrm>
+            <a:off x="3851918" y="987574"/>
+            <a:ext cx="5188653" cy="3283176"/>
+          </a:xfrm>
+          <a:prstGeom prst="rect">
+            <a:avLst/>
+          </a:prstGeom>
+          <a:noFill/>
+          <a:ln>
+            <a:noFill/>
+          </a:ln>
+          <a:extLst>
+            <a:ext uri="{909E8E84-426E-40DD-AFC4-6F175D3DCCD1}">
+              <a14:hiddenFill xmlns:a14="http://schemas.microsoft.com/office/drawing/2010/main">
+                <a:solidFill>
+                  <a:schemeClr val="accent1"/>
+                </a:solidFill>
+              </a14:hiddenFill>
+            </a:ext>
+            <a:ext uri="{91240B29-F687-4F45-9708-019B960494DF}">
+              <a14:hiddenLine xmlns:a14="http://schemas.microsoft.com/office/drawing/2010/main" w="9525">
+                <a:solidFill>
+                  <a:schemeClr val="tx1"/>
+                </a:solidFill>
+                <a:miter lim="800000"/>
+                <a:headEnd/>
+                <a:tailEnd/>
+              </a14:hiddenLine>
+            </a:ext>
+          </a:extLst>
+        </p:spPr>
+      </p:pic>
+      <p:sp>
+        <p:nvSpPr>
+          <p:cNvPr id="7" name="Symbol zastępczy zawartości 2"/>
+          <p:cNvSpPr>
+            <a:spLocks noGrp="1"/>
+          </p:cNvSpPr>
+          <p:nvPr>
+            <p:ph idx="1"/>
+          </p:nvPr>
+        </p:nvSpPr>
+        <p:spPr>
+          <a:xfrm>
+            <a:off x="395536" y="4476875"/>
+            <a:ext cx="8067645" cy="666625"/>
+          </a:xfrm>
+        </p:spPr>
+        <p:txBody>
+          <a:bodyPr>
+            <a:normAutofit/>
+          </a:bodyPr>
+          <a:lstStyle/>
+          <a:p>
+            <a:r>
+              <a:rPr lang="pl-PL" sz="1800" dirty="0" smtClean="0"/>
+              <a:t>Przedstawiona miara centralności grafu obejmuje tylko najbliższe wierzchołki, przez co trudno jest je wykorzystać do wykrycia intensywności ruchu</a:t>
+            </a:r>
+            <a:endParaRPr lang="pl-PL" sz="1800" dirty="0"/>
+          </a:p>
+        </p:txBody>
+      </p:sp>
+    </p:spTree>
+    <p:extLst>
+      <p:ext uri="{BB962C8B-B14F-4D97-AF65-F5344CB8AC3E}">
+        <p14:creationId xmlns:p14="http://schemas.microsoft.com/office/powerpoint/2010/main" val="817425578"/>
       </p:ext>
     </p:extLst>
   </p:cSld>
@@ -4520,22 +4685,27 @@
             <p:ph type="title"/>
           </p:nvPr>
         </p:nvSpPr>
-        <p:spPr/>
+        <p:spPr>
+          <a:xfrm>
+            <a:off x="395536" y="0"/>
+            <a:ext cx="8229600" cy="857250"/>
+          </a:xfrm>
+        </p:spPr>
         <p:txBody>
           <a:bodyPr/>
           <a:lstStyle/>
           <a:p>
             <a:r>
-              <a:rPr lang="pl-PL" dirty="0" err="1" smtClean="0"/>
-              <a:t>Local</a:t>
-            </a:r>
-            <a:r>
-              <a:rPr lang="pl-PL" dirty="0" smtClean="0"/>
-              <a:t> Clustering </a:t>
-            </a:r>
-            <a:r>
-              <a:rPr lang="pl-PL" dirty="0" err="1" smtClean="0"/>
-              <a:t>Coefficient</a:t>
+              <a:rPr lang="pl-PL" dirty="0" err="1"/>
+              <a:t>Betweenness</a:t>
+            </a:r>
+            <a:r>
+              <a:rPr lang="pl-PL" dirty="0"/>
+              <a:t> </a:t>
+            </a:r>
+            <a:r>
+              <a:rPr lang="pl-PL" dirty="0" err="1"/>
+              <a:t>centrality</a:t>
             </a:r>
             <a:endParaRPr lang="pl-PL" dirty="0"/>
           </a:p>
@@ -4543,14 +4713,14 @@
       </p:sp>
       <p:pic>
         <p:nvPicPr>
-          <p:cNvPr id="3074" name="Picture 2"/>
+          <p:cNvPr id="4098" name="Picture 2"/>
           <p:cNvPicPr>
             <a:picLocks noChangeAspect="1" noChangeArrowheads="1"/>
           </p:cNvPicPr>
           <p:nvPr/>
         </p:nvPicPr>
         <p:blipFill>
-          <a:blip r:embed="rId2">
+          <a:blip r:embed="rId2" cstate="print">
             <a:extLst>
               <a:ext uri="{28A0092B-C50C-407E-A947-70E740481C1C}">
                 <a14:useLocalDpi xmlns:a14="http://schemas.microsoft.com/office/drawing/2010/main" val="0"/>
@@ -4564,8 +4734,8 @@
         </p:blipFill>
         <p:spPr bwMode="auto">
           <a:xfrm>
-            <a:off x="611560" y="1492232"/>
-            <a:ext cx="2952328" cy="349827"/>
+            <a:off x="489518" y="2427734"/>
+            <a:ext cx="1956445" cy="738018"/>
           </a:xfrm>
           <a:prstGeom prst="rect">
             <a:avLst/>
@@ -4597,7 +4767,7 @@
       </p:pic>
       <p:pic>
         <p:nvPicPr>
-          <p:cNvPr id="3075" name="Picture 3"/>
+          <p:cNvPr id="4100" name="Picture 4"/>
           <p:cNvPicPr>
             <a:picLocks noChangeAspect="1" noChangeArrowheads="1"/>
           </p:cNvPicPr>
@@ -4618,8 +4788,8 @@
         </p:blipFill>
         <p:spPr bwMode="auto">
           <a:xfrm>
-            <a:off x="506363" y="2158628"/>
-            <a:ext cx="3057525" cy="619125"/>
+            <a:off x="3059831" y="771550"/>
+            <a:ext cx="5820241" cy="3600400"/>
           </a:xfrm>
           <a:prstGeom prst="rect">
             <a:avLst/>
@@ -4649,290 +4819,36 @@
           </a:extLst>
         </p:spPr>
       </p:pic>
-      <p:pic>
-        <p:nvPicPr>
-          <p:cNvPr id="3076" name="Picture 4"/>
-          <p:cNvPicPr>
-            <a:picLocks noChangeAspect="1" noChangeArrowheads="1"/>
-          </p:cNvPicPr>
-          <p:nvPr/>
-        </p:nvPicPr>
-        <p:blipFill>
-          <a:blip r:embed="rId4">
-            <a:extLst>
-              <a:ext uri="{28A0092B-C50C-407E-A947-70E740481C1C}">
-                <a14:useLocalDpi xmlns:a14="http://schemas.microsoft.com/office/drawing/2010/main" val="0"/>
-              </a:ext>
-            </a:extLst>
-          </a:blip>
-          <a:srcRect/>
-          <a:stretch>
-            <a:fillRect/>
-          </a:stretch>
-        </p:blipFill>
-        <p:spPr bwMode="auto">
-          <a:xfrm>
-            <a:off x="683568" y="3032107"/>
-            <a:ext cx="2857676" cy="1843899"/>
-          </a:xfrm>
-          <a:prstGeom prst="rect">
-            <a:avLst/>
-          </a:prstGeom>
-          <a:noFill/>
-          <a:ln>
-            <a:noFill/>
-          </a:ln>
-          <a:extLst>
-            <a:ext uri="{909E8E84-426E-40DD-AFC4-6F175D3DCCD1}">
-              <a14:hiddenFill xmlns:a14="http://schemas.microsoft.com/office/drawing/2010/main">
-                <a:solidFill>
-                  <a:schemeClr val="accent1"/>
-                </a:solidFill>
-              </a14:hiddenFill>
-            </a:ext>
-            <a:ext uri="{91240B29-F687-4F45-9708-019B960494DF}">
-              <a14:hiddenLine xmlns:a14="http://schemas.microsoft.com/office/drawing/2010/main" w="9525">
-                <a:solidFill>
-                  <a:schemeClr val="tx1"/>
-                </a:solidFill>
-                <a:miter lim="800000"/>
-                <a:headEnd/>
-                <a:tailEnd/>
-              </a14:hiddenLine>
-            </a:ext>
-          </a:extLst>
-        </p:spPr>
-      </p:pic>
-      <p:pic>
-        <p:nvPicPr>
-          <p:cNvPr id="3077" name="Picture 5"/>
-          <p:cNvPicPr>
-            <a:picLocks noChangeAspect="1" noChangeArrowheads="1"/>
-          </p:cNvPicPr>
-          <p:nvPr/>
-        </p:nvPicPr>
-        <p:blipFill>
-          <a:blip r:embed="rId5">
-            <a:extLst>
-              <a:ext uri="{28A0092B-C50C-407E-A947-70E740481C1C}">
-                <a14:useLocalDpi xmlns:a14="http://schemas.microsoft.com/office/drawing/2010/main" val="0"/>
-              </a:ext>
-            </a:extLst>
-          </a:blip>
-          <a:srcRect/>
-          <a:stretch>
-            <a:fillRect/>
-          </a:stretch>
-        </p:blipFill>
-        <p:spPr bwMode="auto">
-          <a:xfrm>
-            <a:off x="3851919" y="1563639"/>
-            <a:ext cx="5188653" cy="3283176"/>
-          </a:xfrm>
-          <a:prstGeom prst="rect">
-            <a:avLst/>
-          </a:prstGeom>
-          <a:noFill/>
-          <a:ln>
-            <a:noFill/>
-          </a:ln>
-          <a:extLst>
-            <a:ext uri="{909E8E84-426E-40DD-AFC4-6F175D3DCCD1}">
-              <a14:hiddenFill xmlns:a14="http://schemas.microsoft.com/office/drawing/2010/main">
-                <a:solidFill>
-                  <a:schemeClr val="accent1"/>
-                </a:solidFill>
-              </a14:hiddenFill>
-            </a:ext>
-            <a:ext uri="{91240B29-F687-4F45-9708-019B960494DF}">
-              <a14:hiddenLine xmlns:a14="http://schemas.microsoft.com/office/drawing/2010/main" w="9525">
-                <a:solidFill>
-                  <a:schemeClr val="tx1"/>
-                </a:solidFill>
-                <a:miter lim="800000"/>
-                <a:headEnd/>
-                <a:tailEnd/>
-              </a14:hiddenLine>
-            </a:ext>
-          </a:extLst>
-        </p:spPr>
-      </p:pic>
-    </p:spTree>
-    <p:extLst>
-      <p:ext uri="{BB962C8B-B14F-4D97-AF65-F5344CB8AC3E}">
-        <p14:creationId xmlns:p14="http://schemas.microsoft.com/office/powerpoint/2010/main" val="817425578"/>
-      </p:ext>
-    </p:extLst>
-  </p:cSld>
-  <p:clrMapOvr>
-    <a:masterClrMapping/>
-  </p:clrMapOvr>
-  <p:timing>
-    <p:tnLst>
-      <p:par>
-        <p:cTn id="1" dur="indefinite" restart="never" nodeType="tmRoot"/>
-      </p:par>
-    </p:tnLst>
-  </p:timing>
-</p:sld>
-</file>
-
-<file path=ppt/slides/slide6.xml><?xml version="1.0" encoding="utf-8"?>
-<p:sld xmlns:a="http://schemas.openxmlformats.org/drawingml/2006/main" xmlns:r="http://schemas.openxmlformats.org/officeDocument/2006/relationships" xmlns:p="http://schemas.openxmlformats.org/presentationml/2006/main">
-  <p:cSld>
-    <p:spTree>
-      <p:nvGrpSpPr>
-        <p:cNvPr id="1" name=""/>
-        <p:cNvGrpSpPr/>
-        <p:nvPr/>
-      </p:nvGrpSpPr>
-      <p:grpSpPr>
-        <a:xfrm>
-          <a:off x="0" y="0"/>
-          <a:ext cx="0" cy="0"/>
-          <a:chOff x="0" y="0"/>
-          <a:chExt cx="0" cy="0"/>
-        </a:xfrm>
-      </p:grpSpPr>
-      <p:sp>
-        <p:nvSpPr>
-          <p:cNvPr id="2" name="Tytuł 1"/>
-          <p:cNvSpPr>
-            <a:spLocks noGrp="1"/>
-          </p:cNvSpPr>
-          <p:nvPr>
-            <p:ph type="title"/>
-          </p:nvPr>
-        </p:nvSpPr>
-        <p:spPr/>
-        <p:txBody>
-          <a:bodyPr/>
-          <a:lstStyle/>
-          <a:p>
-            <a:r>
-              <a:rPr lang="pl-PL" dirty="0" err="1"/>
-              <a:t>Betweenness</a:t>
-            </a:r>
-            <a:r>
-              <a:rPr lang="pl-PL" dirty="0"/>
-              <a:t> </a:t>
-            </a:r>
-            <a:r>
-              <a:rPr lang="pl-PL" dirty="0" err="1"/>
-              <a:t>centrality</a:t>
-            </a:r>
-            <a:endParaRPr lang="pl-PL" dirty="0"/>
-          </a:p>
-        </p:txBody>
-      </p:sp>
-      <p:pic>
-        <p:nvPicPr>
-          <p:cNvPr id="4098" name="Picture 2"/>
-          <p:cNvPicPr>
-            <a:picLocks noChangeAspect="1" noChangeArrowheads="1"/>
-          </p:cNvPicPr>
-          <p:nvPr/>
-        </p:nvPicPr>
-        <p:blipFill>
-          <a:blip r:embed="rId2" cstate="print">
-            <a:extLst>
-              <a:ext uri="{28A0092B-C50C-407E-A947-70E740481C1C}">
-                <a14:useLocalDpi xmlns:a14="http://schemas.microsoft.com/office/drawing/2010/main" val="0"/>
-              </a:ext>
-            </a:extLst>
-          </a:blip>
-          <a:srcRect/>
-          <a:stretch>
-            <a:fillRect/>
-          </a:stretch>
-        </p:blipFill>
-        <p:spPr bwMode="auto">
-          <a:xfrm>
-            <a:off x="489518" y="2427734"/>
-            <a:ext cx="1956445" cy="738018"/>
-          </a:xfrm>
-          <a:prstGeom prst="rect">
-            <a:avLst/>
-          </a:prstGeom>
-          <a:noFill/>
-          <a:ln>
-            <a:noFill/>
-          </a:ln>
-          <a:extLst>
-            <a:ext uri="{909E8E84-426E-40DD-AFC4-6F175D3DCCD1}">
-              <a14:hiddenFill xmlns:a14="http://schemas.microsoft.com/office/drawing/2010/main">
-                <a:solidFill>
-                  <a:schemeClr val="accent1"/>
-                </a:solidFill>
-              </a14:hiddenFill>
-            </a:ext>
-            <a:ext uri="{91240B29-F687-4F45-9708-019B960494DF}">
-              <a14:hiddenLine xmlns:a14="http://schemas.microsoft.com/office/drawing/2010/main" w="9525">
-                <a:solidFill>
-                  <a:schemeClr val="tx1"/>
-                </a:solidFill>
-                <a:miter lim="800000"/>
-                <a:headEnd/>
-                <a:tailEnd/>
-              </a14:hiddenLine>
-            </a:ext>
-          </a:extLst>
-        </p:spPr>
-      </p:pic>
-      <p:pic>
-        <p:nvPicPr>
-          <p:cNvPr id="4100" name="Picture 4"/>
-          <p:cNvPicPr>
-            <a:picLocks noChangeAspect="1" noChangeArrowheads="1"/>
-          </p:cNvPicPr>
-          <p:nvPr/>
-        </p:nvPicPr>
-        <p:blipFill>
-          <a:blip r:embed="rId3">
-            <a:extLst>
-              <a:ext uri="{28A0092B-C50C-407E-A947-70E740481C1C}">
-                <a14:useLocalDpi xmlns:a14="http://schemas.microsoft.com/office/drawing/2010/main" val="0"/>
-              </a:ext>
-            </a:extLst>
-          </a:blip>
-          <a:srcRect/>
-          <a:stretch>
-            <a:fillRect/>
-          </a:stretch>
-        </p:blipFill>
-        <p:spPr bwMode="auto">
-          <a:xfrm>
-            <a:off x="3059832" y="1131590"/>
-            <a:ext cx="5820241" cy="3600400"/>
-          </a:xfrm>
-          <a:prstGeom prst="rect">
-            <a:avLst/>
-          </a:prstGeom>
-          <a:noFill/>
-          <a:ln>
-            <a:noFill/>
-          </a:ln>
-          <a:extLst>
-            <a:ext uri="{909E8E84-426E-40DD-AFC4-6F175D3DCCD1}">
-              <a14:hiddenFill xmlns:a14="http://schemas.microsoft.com/office/drawing/2010/main">
-                <a:solidFill>
-                  <a:schemeClr val="accent1"/>
-                </a:solidFill>
-              </a14:hiddenFill>
-            </a:ext>
-            <a:ext uri="{91240B29-F687-4F45-9708-019B960494DF}">
-              <a14:hiddenLine xmlns:a14="http://schemas.microsoft.com/office/drawing/2010/main" w="9525">
-                <a:solidFill>
-                  <a:schemeClr val="tx1"/>
-                </a:solidFill>
-                <a:miter lim="800000"/>
-                <a:headEnd/>
-                <a:tailEnd/>
-              </a14:hiddenLine>
-            </a:ext>
-          </a:extLst>
-        </p:spPr>
-      </p:pic>
+      <p:sp>
+        <p:nvSpPr>
+          <p:cNvPr id="5" name="Symbol zastępczy zawartości 2"/>
+          <p:cNvSpPr>
+            <a:spLocks noGrp="1"/>
+          </p:cNvSpPr>
+          <p:nvPr>
+            <p:ph idx="1"/>
+          </p:nvPr>
+        </p:nvSpPr>
+        <p:spPr>
+          <a:xfrm>
+            <a:off x="395536" y="4476875"/>
+            <a:ext cx="8067645" cy="666625"/>
+          </a:xfrm>
+        </p:spPr>
+        <p:txBody>
+          <a:bodyPr>
+            <a:normAutofit/>
+          </a:bodyPr>
+          <a:lstStyle/>
+          <a:p>
+            <a:r>
+              <a:rPr lang="pl-PL" sz="1800" dirty="0" smtClean="0"/>
+              <a:t>Ta miara centralności potrafi dobrze wskazać, które fragmenty drogi mają większe znaczenie w komunikacji</a:t>
+            </a:r>
+            <a:endParaRPr lang="pl-PL" sz="1800" dirty="0"/>
+          </a:p>
+        </p:txBody>
+      </p:sp>
     </p:spTree>
     <p:extLst>
       <p:ext uri="{BB962C8B-B14F-4D97-AF65-F5344CB8AC3E}">
@@ -4953,7 +4869,7 @@
 </p:sld>
 </file>
 
-<file path=ppt/slides/slide7.xml><?xml version="1.0" encoding="utf-8"?>
+<file path=ppt/slides/slide6.xml><?xml version="1.0" encoding="utf-8"?>
 <p:sld xmlns:a="http://schemas.openxmlformats.org/drawingml/2006/main" xmlns:r="http://schemas.openxmlformats.org/officeDocument/2006/relationships" xmlns:p="http://schemas.openxmlformats.org/presentationml/2006/main">
   <p:cSld>
     <p:spTree>
@@ -4993,7 +4909,7 @@
         </p:blipFill>
         <p:spPr bwMode="auto">
           <a:xfrm>
-            <a:off x="0" y="1707654"/>
+            <a:off x="107504" y="1068031"/>
             <a:ext cx="5130864" cy="3435846"/>
           </a:xfrm>
           <a:prstGeom prst="rect">
@@ -5076,7 +4992,7 @@
         </p:nvSpPr>
         <p:spPr>
           <a:xfrm>
-            <a:off x="323528" y="1234909"/>
+            <a:off x="107504" y="699542"/>
             <a:ext cx="1734834" cy="369332"/>
           </a:xfrm>
           <a:prstGeom prst="rect">
@@ -5125,6 +5041,36 @@
               <a:t>Miara: czas przejazdu</a:t>
             </a:r>
             <a:endParaRPr lang="pl-PL" dirty="0"/>
+          </a:p>
+        </p:txBody>
+      </p:sp>
+      <p:sp>
+        <p:nvSpPr>
+          <p:cNvPr id="6" name="Symbol zastępczy zawartości 2"/>
+          <p:cNvSpPr>
+            <a:spLocks noGrp="1"/>
+          </p:cNvSpPr>
+          <p:nvPr>
+            <p:ph idx="1"/>
+          </p:nvPr>
+        </p:nvSpPr>
+        <p:spPr>
+          <a:xfrm>
+            <a:off x="395536" y="4476875"/>
+            <a:ext cx="8280920" cy="666625"/>
+          </a:xfrm>
+        </p:spPr>
+        <p:txBody>
+          <a:bodyPr>
+            <a:normAutofit/>
+          </a:bodyPr>
+          <a:lstStyle/>
+          <a:p>
+            <a:r>
+              <a:rPr lang="pl-PL" sz="1800" dirty="0" smtClean="0"/>
+              <a:t>Zmiana miary na wykorzystanie czasu przejazdu potrafi lepiej przedstawić rangę danej drogi (zmiany widoczne głównie na węzłach autostrady i głównych drogach)</a:t>
+            </a:r>
+            <a:endParaRPr lang="pl-PL" sz="1800" dirty="0"/>
           </a:p>
         </p:txBody>
       </p:sp>
@@ -5148,7 +5094,7 @@
 </p:sld>
 </file>
 
-<file path=ppt/slides/slide8.xml><?xml version="1.0" encoding="utf-8"?>
+<file path=ppt/slides/slide7.xml><?xml version="1.0" encoding="utf-8"?>
 <p:sld xmlns:a="http://schemas.openxmlformats.org/drawingml/2006/main" xmlns:r="http://schemas.openxmlformats.org/officeDocument/2006/relationships" xmlns:p="http://schemas.openxmlformats.org/presentationml/2006/main">
   <p:cSld>
     <p:spTree>
@@ -5296,7 +5242,7 @@
         </p:blipFill>
         <p:spPr bwMode="auto">
           <a:xfrm>
-            <a:off x="4247456" y="2079762"/>
+            <a:off x="4247456" y="1530190"/>
             <a:ext cx="4896544" cy="3071652"/>
           </a:xfrm>
           <a:prstGeom prst="rect">
@@ -5371,6 +5317,36 @@
           </a:extLst>
         </p:spPr>
       </p:pic>
+      <p:sp>
+        <p:nvSpPr>
+          <p:cNvPr id="6" name="Symbol zastępczy zawartości 2"/>
+          <p:cNvSpPr>
+            <a:spLocks noGrp="1"/>
+          </p:cNvSpPr>
+          <p:nvPr>
+            <p:ph idx="1"/>
+          </p:nvPr>
+        </p:nvSpPr>
+        <p:spPr>
+          <a:xfrm>
+            <a:off x="395536" y="4476875"/>
+            <a:ext cx="8280920" cy="666625"/>
+          </a:xfrm>
+        </p:spPr>
+        <p:txBody>
+          <a:bodyPr>
+            <a:normAutofit/>
+          </a:bodyPr>
+          <a:lstStyle/>
+          <a:p>
+            <a:r>
+              <a:rPr lang="pl-PL" sz="1800" dirty="0" smtClean="0"/>
+              <a:t>Dodanie powstającego węzła w Zakrzowie pozytywnie wpłynęło na ruch w Wieliczce</a:t>
+            </a:r>
+            <a:endParaRPr lang="pl-PL" sz="1800" dirty="0"/>
+          </a:p>
+        </p:txBody>
+      </p:sp>
     </p:spTree>
     <p:extLst>
       <p:ext uri="{BB962C8B-B14F-4D97-AF65-F5344CB8AC3E}">
@@ -5391,7 +5367,7 @@
 </p:sld>
 </file>
 
-<file path=ppt/slides/slide9.xml><?xml version="1.0" encoding="utf-8"?>
+<file path=ppt/slides/slide8.xml><?xml version="1.0" encoding="utf-8"?>
 <p:sld xmlns:a="http://schemas.openxmlformats.org/drawingml/2006/main" xmlns:r="http://schemas.openxmlformats.org/officeDocument/2006/relationships" xmlns:p="http://schemas.openxmlformats.org/presentationml/2006/main">
   <p:cSld>
     <p:spTree>
@@ -5480,7 +5456,7 @@
         </p:blipFill>
         <p:spPr bwMode="auto">
           <a:xfrm>
-            <a:off x="4247456" y="1254688"/>
+            <a:off x="4247456" y="699542"/>
             <a:ext cx="4896544" cy="3888812"/>
           </a:xfrm>
           <a:prstGeom prst="rect">
@@ -5514,7 +5490,7 @@
         </p:nvCxnSpPr>
         <p:spPr>
           <a:xfrm flipV="1">
-            <a:off x="5942533" y="2355726"/>
+            <a:off x="5436096" y="1681919"/>
             <a:ext cx="360000" cy="360040"/>
           </a:xfrm>
           <a:prstGeom prst="straightConnector1">
@@ -5542,10 +5518,354 @@
           </a:fontRef>
         </p:style>
       </p:cxnSp>
+      <p:sp>
+        <p:nvSpPr>
+          <p:cNvPr id="5" name="Symbol zastępczy zawartości 2"/>
+          <p:cNvSpPr>
+            <a:spLocks noGrp="1"/>
+          </p:cNvSpPr>
+          <p:nvPr>
+            <p:ph idx="1"/>
+          </p:nvPr>
+        </p:nvSpPr>
+        <p:spPr>
+          <a:xfrm>
+            <a:off x="395536" y="4476875"/>
+            <a:ext cx="8280920" cy="666625"/>
+          </a:xfrm>
+        </p:spPr>
+        <p:txBody>
+          <a:bodyPr>
+            <a:normAutofit/>
+          </a:bodyPr>
+          <a:lstStyle/>
+          <a:p>
+            <a:r>
+              <a:rPr lang="pl-PL" sz="1800" dirty="0" smtClean="0"/>
+              <a:t>Dodanie obecnie remontowanej ul. Królewskiej pozwoliło zmniejszyć ruch na ul. Czarnowiejskiej</a:t>
+            </a:r>
+            <a:endParaRPr lang="pl-PL" sz="1800" dirty="0"/>
+          </a:p>
+        </p:txBody>
+      </p:sp>
     </p:spTree>
     <p:extLst>
       <p:ext uri="{BB962C8B-B14F-4D97-AF65-F5344CB8AC3E}">
         <p14:creationId xmlns:p14="http://schemas.microsoft.com/office/powerpoint/2010/main" val="2906506023"/>
+      </p:ext>
+    </p:extLst>
+  </p:cSld>
+  <p:clrMapOvr>
+    <a:masterClrMapping/>
+  </p:clrMapOvr>
+  <p:timing>
+    <p:tnLst>
+      <p:par>
+        <p:cTn id="1" dur="indefinite" restart="never" nodeType="tmRoot"/>
+      </p:par>
+    </p:tnLst>
+  </p:timing>
+</p:sld>
+</file>
+
+<file path=ppt/slides/slide9.xml><?xml version="1.0" encoding="utf-8"?>
+<p:sld xmlns:a="http://schemas.openxmlformats.org/drawingml/2006/main" xmlns:r="http://schemas.openxmlformats.org/officeDocument/2006/relationships" xmlns:p="http://schemas.openxmlformats.org/presentationml/2006/main">
+  <p:cSld>
+    <p:spTree>
+      <p:nvGrpSpPr>
+        <p:cNvPr id="1" name=""/>
+        <p:cNvGrpSpPr/>
+        <p:nvPr/>
+      </p:nvGrpSpPr>
+      <p:grpSpPr>
+        <a:xfrm>
+          <a:off x="0" y="0"/>
+          <a:ext cx="0" cy="0"/>
+          <a:chOff x="0" y="0"/>
+          <a:chExt cx="0" cy="0"/>
+        </a:xfrm>
+      </p:grpSpPr>
+      <p:pic>
+        <p:nvPicPr>
+          <p:cNvPr id="4" name="Picture 3"/>
+          <p:cNvPicPr>
+            <a:picLocks noChangeAspect="1" noChangeArrowheads="1"/>
+          </p:cNvPicPr>
+          <p:nvPr/>
+        </p:nvPicPr>
+        <p:blipFill>
+          <a:blip r:embed="rId2">
+            <a:extLst>
+              <a:ext uri="{28A0092B-C50C-407E-A947-70E740481C1C}">
+                <a14:useLocalDpi xmlns:a14="http://schemas.microsoft.com/office/drawing/2010/main" val="0"/>
+              </a:ext>
+            </a:extLst>
+          </a:blip>
+          <a:srcRect/>
+          <a:stretch>
+            <a:fillRect/>
+          </a:stretch>
+        </p:blipFill>
+        <p:spPr bwMode="auto">
+          <a:xfrm>
+            <a:off x="0" y="0"/>
+            <a:ext cx="4896544" cy="3888812"/>
+          </a:xfrm>
+          <a:prstGeom prst="rect">
+            <a:avLst/>
+          </a:prstGeom>
+          <a:noFill/>
+          <a:ln w="9525">
+            <a:solidFill>
+              <a:srgbClr val="C00000"/>
+            </a:solidFill>
+            <a:miter lim="800000"/>
+            <a:headEnd/>
+            <a:tailEnd/>
+          </a:ln>
+          <a:extLst>
+            <a:ext uri="{909E8E84-426E-40DD-AFC4-6F175D3DCCD1}">
+              <a14:hiddenFill xmlns:a14="http://schemas.microsoft.com/office/drawing/2010/main">
+                <a:solidFill>
+                  <a:schemeClr val="accent1"/>
+                </a:solidFill>
+              </a14:hiddenFill>
+            </a:ext>
+          </a:extLst>
+        </p:spPr>
+      </p:pic>
+      <p:pic>
+        <p:nvPicPr>
+          <p:cNvPr id="8195" name="Picture 3"/>
+          <p:cNvPicPr>
+            <a:picLocks noChangeAspect="1" noChangeArrowheads="1"/>
+          </p:cNvPicPr>
+          <p:nvPr/>
+        </p:nvPicPr>
+        <p:blipFill>
+          <a:blip r:embed="rId3">
+            <a:extLst>
+              <a:ext uri="{28A0092B-C50C-407E-A947-70E740481C1C}">
+                <a14:useLocalDpi xmlns:a14="http://schemas.microsoft.com/office/drawing/2010/main" val="0"/>
+              </a:ext>
+            </a:extLst>
+          </a:blip>
+          <a:srcRect/>
+          <a:stretch>
+            <a:fillRect/>
+          </a:stretch>
+        </p:blipFill>
+        <p:spPr bwMode="auto">
+          <a:xfrm>
+            <a:off x="4430305" y="339502"/>
+            <a:ext cx="4713695" cy="4118826"/>
+          </a:xfrm>
+          <a:prstGeom prst="rect">
+            <a:avLst/>
+          </a:prstGeom>
+          <a:noFill/>
+          <a:ln>
+            <a:noFill/>
+          </a:ln>
+          <a:extLst>
+            <a:ext uri="{909E8E84-426E-40DD-AFC4-6F175D3DCCD1}">
+              <a14:hiddenFill xmlns:a14="http://schemas.microsoft.com/office/drawing/2010/main">
+                <a:solidFill>
+                  <a:schemeClr val="accent1"/>
+                </a:solidFill>
+              </a14:hiddenFill>
+            </a:ext>
+            <a:ext uri="{91240B29-F687-4F45-9708-019B960494DF}">
+              <a14:hiddenLine xmlns:a14="http://schemas.microsoft.com/office/drawing/2010/main" w="9525">
+                <a:solidFill>
+                  <a:schemeClr val="tx1"/>
+                </a:solidFill>
+                <a:miter lim="800000"/>
+                <a:headEnd/>
+                <a:tailEnd/>
+              </a14:hiddenLine>
+            </a:ext>
+          </a:extLst>
+        </p:spPr>
+      </p:pic>
+      <p:cxnSp>
+        <p:nvCxnSpPr>
+          <p:cNvPr id="7" name="Łącznik prosty ze strzałką 6"/>
+          <p:cNvCxnSpPr/>
+          <p:nvPr/>
+        </p:nvCxnSpPr>
+        <p:spPr>
+          <a:xfrm flipV="1">
+            <a:off x="7166609" y="3087926"/>
+            <a:ext cx="360000" cy="360040"/>
+          </a:xfrm>
+          <a:prstGeom prst="straightConnector1">
+            <a:avLst/>
+          </a:prstGeom>
+          <a:ln w="38100">
+            <a:solidFill>
+              <a:srgbClr val="C00000"/>
+            </a:solidFill>
+            <a:tailEnd type="arrow"/>
+          </a:ln>
+        </p:spPr>
+        <p:style>
+          <a:lnRef idx="1">
+            <a:schemeClr val="accent1"/>
+          </a:lnRef>
+          <a:fillRef idx="0">
+            <a:schemeClr val="accent1"/>
+          </a:fillRef>
+          <a:effectRef idx="0">
+            <a:schemeClr val="accent1"/>
+          </a:effectRef>
+          <a:fontRef idx="minor">
+            <a:schemeClr val="tx1"/>
+          </a:fontRef>
+        </p:style>
+      </p:cxnSp>
+      <p:cxnSp>
+        <p:nvCxnSpPr>
+          <p:cNvPr id="10" name="Łącznik prosty ze strzałką 9"/>
+          <p:cNvCxnSpPr/>
+          <p:nvPr/>
+        </p:nvCxnSpPr>
+        <p:spPr>
+          <a:xfrm flipV="1">
+            <a:off x="6088568" y="4017841"/>
+            <a:ext cx="360000" cy="360040"/>
+          </a:xfrm>
+          <a:prstGeom prst="straightConnector1">
+            <a:avLst/>
+          </a:prstGeom>
+          <a:ln w="38100">
+            <a:solidFill>
+              <a:srgbClr val="C00000"/>
+            </a:solidFill>
+            <a:tailEnd type="arrow"/>
+          </a:ln>
+        </p:spPr>
+        <p:style>
+          <a:lnRef idx="1">
+            <a:schemeClr val="accent1"/>
+          </a:lnRef>
+          <a:fillRef idx="0">
+            <a:schemeClr val="accent1"/>
+          </a:fillRef>
+          <a:effectRef idx="0">
+            <a:schemeClr val="accent1"/>
+          </a:effectRef>
+          <a:fontRef idx="minor">
+            <a:schemeClr val="tx1"/>
+          </a:fontRef>
+        </p:style>
+      </p:cxnSp>
+      <p:cxnSp>
+        <p:nvCxnSpPr>
+          <p:cNvPr id="11" name="Łącznik prosty ze strzałką 10"/>
+          <p:cNvCxnSpPr/>
+          <p:nvPr/>
+        </p:nvCxnSpPr>
+        <p:spPr>
+          <a:xfrm flipV="1">
+            <a:off x="5431052" y="3087926"/>
+            <a:ext cx="360000" cy="360040"/>
+          </a:xfrm>
+          <a:prstGeom prst="straightConnector1">
+            <a:avLst/>
+          </a:prstGeom>
+          <a:ln w="38100">
+            <a:solidFill>
+              <a:srgbClr val="C00000"/>
+            </a:solidFill>
+            <a:tailEnd type="arrow"/>
+          </a:ln>
+        </p:spPr>
+        <p:style>
+          <a:lnRef idx="1">
+            <a:schemeClr val="accent1"/>
+          </a:lnRef>
+          <a:fillRef idx="0">
+            <a:schemeClr val="accent1"/>
+          </a:fillRef>
+          <a:effectRef idx="0">
+            <a:schemeClr val="accent1"/>
+          </a:effectRef>
+          <a:fontRef idx="minor">
+            <a:schemeClr val="tx1"/>
+          </a:fontRef>
+        </p:style>
+      </p:cxnSp>
+      <p:cxnSp>
+        <p:nvCxnSpPr>
+          <p:cNvPr id="12" name="Łącznik prosty ze strzałką 11"/>
+          <p:cNvCxnSpPr/>
+          <p:nvPr/>
+        </p:nvCxnSpPr>
+        <p:spPr>
+          <a:xfrm flipV="1">
+            <a:off x="8534761" y="1382522"/>
+            <a:ext cx="360000" cy="360040"/>
+          </a:xfrm>
+          <a:prstGeom prst="straightConnector1">
+            <a:avLst/>
+          </a:prstGeom>
+          <a:ln w="38100">
+            <a:solidFill>
+              <a:srgbClr val="C00000"/>
+            </a:solidFill>
+            <a:tailEnd type="arrow"/>
+          </a:ln>
+        </p:spPr>
+        <p:style>
+          <a:lnRef idx="1">
+            <a:schemeClr val="accent1"/>
+          </a:lnRef>
+          <a:fillRef idx="0">
+            <a:schemeClr val="accent1"/>
+          </a:fillRef>
+          <a:effectRef idx="0">
+            <a:schemeClr val="accent1"/>
+          </a:effectRef>
+          <a:fontRef idx="minor">
+            <a:schemeClr val="tx1"/>
+          </a:fontRef>
+        </p:style>
+      </p:cxnSp>
+      <p:sp>
+        <p:nvSpPr>
+          <p:cNvPr id="8" name="Symbol zastępczy zawartości 2"/>
+          <p:cNvSpPr>
+            <a:spLocks noGrp="1"/>
+          </p:cNvSpPr>
+          <p:nvPr>
+            <p:ph idx="1"/>
+          </p:nvPr>
+        </p:nvSpPr>
+        <p:spPr>
+          <a:xfrm>
+            <a:off x="395536" y="4476875"/>
+            <a:ext cx="8280920" cy="666625"/>
+          </a:xfrm>
+        </p:spPr>
+        <p:txBody>
+          <a:bodyPr>
+            <a:normAutofit/>
+          </a:bodyPr>
+          <a:lstStyle/>
+          <a:p>
+            <a:r>
+              <a:rPr lang="pl-PL" sz="1800" dirty="0" smtClean="0"/>
+              <a:t>Jednak nie wszystkie zmiany dają widoczny rezultat</a:t>
+            </a:r>
+            <a:endParaRPr lang="pl-PL" sz="1800" dirty="0"/>
+          </a:p>
+        </p:txBody>
+      </p:sp>
+    </p:spTree>
+    <p:extLst>
+      <p:ext uri="{BB962C8B-B14F-4D97-AF65-F5344CB8AC3E}">
+        <p14:creationId xmlns:p14="http://schemas.microsoft.com/office/powerpoint/2010/main" val="1966361253"/>
       </p:ext>
     </p:extLst>
   </p:cSld>

</xml_diff>